<commit_message>
Add result slide on context menu
</commit_message>
<xml_diff>
--- a/slides/chapter5_displaying_pictures_and_menus.pptx
+++ b/slides/chapter5_displaying_pictures_and_menus.pptx
@@ -5,7 +5,7 @@
     <p:sldMasterId id="2147483660" r:id="rId1"/>
   </p:sldMasterIdLst>
   <p:notesMasterIdLst>
-    <p:notesMasterId r:id="rId18"/>
+    <p:notesMasterId r:id="rId19"/>
   </p:notesMasterIdLst>
   <p:sldIdLst>
     <p:sldId id="256" r:id="rId2"/>
@@ -24,6 +24,7 @@
     <p:sldId id="295" r:id="rId15"/>
     <p:sldId id="297" r:id="rId16"/>
     <p:sldId id="296" r:id="rId17"/>
+    <p:sldId id="298" r:id="rId18"/>
   </p:sldIdLst>
   <p:sldSz cx="9144000" cy="6858000" type="screen4x3"/>
   <p:notesSz cx="7099300" cy="10234613"/>
@@ -5149,11 +5150,7 @@
             </a:r>
             <a:r>
               <a:rPr lang="en-US" dirty="0" smtClean="0"/>
-              <a:t> </a:t>
-            </a:r>
-            <a:r>
-              <a:rPr lang="en-US" dirty="0" smtClean="0"/>
-              <a:t>folder</a:t>
+              <a:t> folder</a:t>
             </a:r>
           </a:p>
           <a:p>
@@ -5289,15 +5286,7 @@
           <a:p>
             <a:r>
               <a:rPr lang="en-US" dirty="0" smtClean="0"/>
-              <a:t>Step 2 – Create the menu as an XML file (</a:t>
-            </a:r>
-            <a:r>
-              <a:rPr lang="en-US" dirty="0" smtClean="0"/>
-              <a:t>tweet_context_menu.xml</a:t>
-            </a:r>
-            <a:r>
-              <a:rPr lang="en-US" dirty="0" smtClean="0"/>
-              <a:t>) in </a:t>
+              <a:t>Step 2 – Create the menu as an XML file (tweet_context_menu.xml) in </a:t>
             </a:r>
             <a:r>
               <a:rPr lang="en-US" i="1" dirty="0" smtClean="0"/>
@@ -7541,11 +7530,7 @@
           <a:p>
             <a:r>
               <a:rPr lang="en-US" dirty="0" smtClean="0"/>
-              <a:t>Step </a:t>
-            </a:r>
-            <a:r>
-              <a:rPr lang="en-US" dirty="0" smtClean="0"/>
-              <a:t>4 </a:t>
+              <a:t>Step 4 </a:t>
             </a:r>
             <a:r>
               <a:rPr lang="en-US" dirty="0"/>
@@ -8241,19 +8226,7 @@
           <a:p>
             <a:r>
               <a:rPr lang="en-US" dirty="0" smtClean="0"/>
-              <a:t>Step </a:t>
-            </a:r>
-            <a:r>
-              <a:rPr lang="en-US" dirty="0" smtClean="0"/>
-              <a:t>5 </a:t>
-            </a:r>
-            <a:r>
-              <a:rPr lang="en-US" dirty="0" smtClean="0"/>
-              <a:t>– Handle the menu click </a:t>
-            </a:r>
-            <a:r>
-              <a:rPr lang="en-US" dirty="0" smtClean="0"/>
-              <a:t>events</a:t>
+              <a:t>Step 5 – Handle the menu click events</a:t>
             </a:r>
           </a:p>
           <a:p>
@@ -8274,7 +8247,6 @@
               <a:rPr lang="en-US" dirty="0" smtClean="0"/>
               <a:t>() method</a:t>
             </a:r>
-            <a:endParaRPr lang="en-US" dirty="0" smtClean="0"/>
           </a:p>
         </p:txBody>
       </p:sp>
@@ -10219,6 +10191,156 @@
     <p:extLst>
       <p:ext uri="{BB962C8B-B14F-4D97-AF65-F5344CB8AC3E}">
         <p14:creationId xmlns:p14="http://schemas.microsoft.com/office/powerpoint/2010/main" val="2304496951"/>
+      </p:ext>
+    </p:extLst>
+  </p:cSld>
+  <p:clrMapOvr>
+    <a:masterClrMapping/>
+  </p:clrMapOvr>
+  <p:timing>
+    <p:tnLst>
+      <p:par>
+        <p:cTn id="1" dur="indefinite" restart="never" nodeType="tmRoot"/>
+      </p:par>
+    </p:tnLst>
+  </p:timing>
+</p:sld>
+</file>
+
+<file path=ppt/slides/slide17.xml><?xml version="1.0" encoding="utf-8"?>
+<p:sld xmlns:a="http://schemas.openxmlformats.org/drawingml/2006/main" xmlns:r="http://schemas.openxmlformats.org/officeDocument/2006/relationships" xmlns:p="http://schemas.openxmlformats.org/presentationml/2006/main">
+  <p:cSld>
+    <p:spTree>
+      <p:nvGrpSpPr>
+        <p:cNvPr id="1" name=""/>
+        <p:cNvGrpSpPr/>
+        <p:nvPr/>
+      </p:nvGrpSpPr>
+      <p:grpSpPr>
+        <a:xfrm>
+          <a:off x="0" y="0"/>
+          <a:ext cx="0" cy="0"/>
+          <a:chOff x="0" y="0"/>
+          <a:chExt cx="0" cy="0"/>
+        </a:xfrm>
+      </p:grpSpPr>
+      <p:sp>
+        <p:nvSpPr>
+          <p:cNvPr id="2" name="Title 1"/>
+          <p:cNvSpPr>
+            <a:spLocks noGrp="1"/>
+          </p:cNvSpPr>
+          <p:nvPr>
+            <p:ph type="title"/>
+          </p:nvPr>
+        </p:nvSpPr>
+        <p:spPr/>
+        <p:txBody>
+          <a:bodyPr/>
+          <a:lstStyle/>
+          <a:p>
+            <a:r>
+              <a:rPr lang="en-US" dirty="0" smtClean="0"/>
+              <a:t>The End Result</a:t>
+            </a:r>
+            <a:endParaRPr lang="en-US" dirty="0"/>
+          </a:p>
+        </p:txBody>
+      </p:sp>
+      <p:sp>
+        <p:nvSpPr>
+          <p:cNvPr id="3" name="Content Placeholder 2"/>
+          <p:cNvSpPr>
+            <a:spLocks noGrp="1"/>
+          </p:cNvSpPr>
+          <p:nvPr>
+            <p:ph idx="1"/>
+          </p:nvPr>
+        </p:nvSpPr>
+        <p:spPr/>
+        <p:txBody>
+          <a:bodyPr/>
+          <a:lstStyle/>
+          <a:p>
+            <a:endParaRPr lang="en-US"/>
+          </a:p>
+        </p:txBody>
+      </p:sp>
+      <p:sp>
+        <p:nvSpPr>
+          <p:cNvPr id="4" name="Slide Number Placeholder 3"/>
+          <p:cNvSpPr>
+            <a:spLocks noGrp="1"/>
+          </p:cNvSpPr>
+          <p:nvPr>
+            <p:ph type="sldNum" sz="quarter" idx="12"/>
+          </p:nvPr>
+        </p:nvSpPr>
+        <p:spPr/>
+        <p:txBody>
+          <a:bodyPr/>
+          <a:lstStyle/>
+          <a:p>
+            <a:fld id="{52DB1A75-B9BE-46B1-B482-5F96E51FA4B2}" type="slidenum">
+              <a:rPr lang="en-US" smtClean="0"/>
+              <a:t>17</a:t>
+            </a:fld>
+            <a:endParaRPr lang="en-US" dirty="0"/>
+          </a:p>
+        </p:txBody>
+      </p:sp>
+      <p:pic>
+        <p:nvPicPr>
+          <p:cNvPr id="5" name="Picture 4"/>
+          <p:cNvPicPr>
+            <a:picLocks noChangeAspect="1"/>
+          </p:cNvPicPr>
+          <p:nvPr/>
+        </p:nvPicPr>
+        <p:blipFill>
+          <a:blip r:embed="rId2"/>
+          <a:stretch>
+            <a:fillRect/>
+          </a:stretch>
+        </p:blipFill>
+        <p:spPr>
+          <a:xfrm>
+            <a:off x="929410" y="1600202"/>
+            <a:ext cx="3248025" cy="4772025"/>
+          </a:xfrm>
+          <a:prstGeom prst="rect">
+            <a:avLst/>
+          </a:prstGeom>
+        </p:spPr>
+      </p:pic>
+      <p:pic>
+        <p:nvPicPr>
+          <p:cNvPr id="6" name="Picture 5"/>
+          <p:cNvPicPr>
+            <a:picLocks noChangeAspect="1"/>
+          </p:cNvPicPr>
+          <p:nvPr/>
+        </p:nvPicPr>
+        <p:blipFill>
+          <a:blip r:embed="rId3"/>
+          <a:stretch>
+            <a:fillRect/>
+          </a:stretch>
+        </p:blipFill>
+        <p:spPr>
+          <a:xfrm>
+            <a:off x="4840856" y="1600202"/>
+            <a:ext cx="3257550" cy="4762500"/>
+          </a:xfrm>
+          <a:prstGeom prst="rect">
+            <a:avLst/>
+          </a:prstGeom>
+        </p:spPr>
+      </p:pic>
+    </p:spTree>
+    <p:extLst>
+      <p:ext uri="{BB962C8B-B14F-4D97-AF65-F5344CB8AC3E}">
+        <p14:creationId xmlns:p14="http://schemas.microsoft.com/office/powerpoint/2010/main" val="4175692836"/>
       </p:ext>
     </p:extLst>
   </p:cSld>
@@ -10918,11 +11040,7 @@
             </a:r>
             <a:r>
               <a:rPr lang="en-US" dirty="0" smtClean="0"/>
-              <a:t> </a:t>
-            </a:r>
-            <a:r>
-              <a:rPr lang="en-US" dirty="0" smtClean="0"/>
-              <a:t>folder</a:t>
+              <a:t> folder</a:t>
             </a:r>
           </a:p>
           <a:p>
@@ -13296,7 +13414,6 @@
               <a:rPr lang="en-US" dirty="0"/>
               <a:t>Handling the Menu Click Events</a:t>
             </a:r>
-            <a:endParaRPr lang="en-US" dirty="0"/>
           </a:p>
         </p:txBody>
       </p:sp>
@@ -13317,11 +13434,7 @@
           <a:p>
             <a:r>
               <a:rPr lang="en-US" dirty="0" smtClean="0"/>
-              <a:t>Step 4 – Handle the menu click </a:t>
-            </a:r>
-            <a:r>
-              <a:rPr lang="en-US" dirty="0" smtClean="0"/>
-              <a:t>events</a:t>
+              <a:t>Step 4 – Handle the menu click events</a:t>
             </a:r>
           </a:p>
           <a:p>

</xml_diff>